<commit_message>
Update Retrospective and README
</commit_message>
<xml_diff>
--- a/docs/Borgs_Retrospective - Sprint 3.pptx
+++ b/docs/Borgs_Retrospective - Sprint 3.pptx
@@ -9306,21 +9306,8 @@
                   <a:schemeClr val="dk1"/>
                 </a:solidFill>
               </a:rPr>
-              <a:t>Daniel – More group meetings to keep each other on the </a:t>
+              <a:t>Daniel – More group meetings to keep each other on the same path. (Ex. Three 1 hour meetings / week)</a:t>
             </a:r>
-            <a:r>
-              <a:rPr lang="en-US" sz="1600">
-                <a:solidFill>
-                  <a:schemeClr val="dk1"/>
-                </a:solidFill>
-              </a:rPr>
-              <a:t>same path.</a:t>
-            </a:r>
-            <a:endParaRPr lang="en-US" sz="1600" dirty="0">
-              <a:solidFill>
-                <a:schemeClr val="dk1"/>
-              </a:solidFill>
-            </a:endParaRPr>
           </a:p>
           <a:p>
             <a:pPr marL="968375" lvl="2" indent="-282575">

</xml_diff>